<commit_message>
Empecé hacer la presentacion de alcance del proyecto
</commit_message>
<xml_diff>
--- a/App/app_documentacion/1er_trimestre/1_proyecto/1_1_1_presentacion_proyecto.pptx
+++ b/App/app_documentacion/1er_trimestre/1_proyecto/1_1_1_presentacion_proyecto.pptx
@@ -19,9 +19,10 @@
     <p:sldId id="264" r:id="rId13"/>
     <p:sldId id="274" r:id="rId14"/>
     <p:sldId id="265" r:id="rId15"/>
-    <p:sldId id="266" r:id="rId16"/>
-    <p:sldId id="267" r:id="rId17"/>
-    <p:sldId id="268" r:id="rId18"/>
+    <p:sldId id="275" r:id="rId16"/>
+    <p:sldId id="266" r:id="rId17"/>
+    <p:sldId id="267" r:id="rId18"/>
+    <p:sldId id="268" r:id="rId19"/>
   </p:sldIdLst>
   <p:sldSz cx="9144000" cy="5143500" type="screen16x9"/>
   <p:notesSz cx="9144000" cy="5143500"/>
@@ -278,7 +279,7 @@
           <a:p>
             <a:fld id="{1D8BD707-D9CF-40AE-B4C6-C98DA3205C09}" type="datetimeFigureOut">
               <a:rPr lang="en-US"/>
-              <a:t>11/30/2021</a:t>
+              <a:t>12/2/2021</a:t>
             </a:fld>
             <a:endParaRPr lang="en-US"/>
           </a:p>
@@ -492,7 +493,7 @@
           <a:p>
             <a:fld id="{1D8BD707-D9CF-40AE-B4C6-C98DA3205C09}" type="datetimeFigureOut">
               <a:rPr lang="en-US"/>
-              <a:t>11/30/2021</a:t>
+              <a:t>12/2/2021</a:t>
             </a:fld>
             <a:endParaRPr lang="en-US"/>
           </a:p>
@@ -795,7 +796,7 @@
           <a:p>
             <a:fld id="{1D8BD707-D9CF-40AE-B4C6-C98DA3205C09}" type="datetimeFigureOut">
               <a:rPr lang="en-US"/>
-              <a:t>11/30/2021</a:t>
+              <a:t>12/2/2021</a:t>
             </a:fld>
             <a:endParaRPr lang="en-US"/>
           </a:p>
@@ -943,7 +944,7 @@
           <a:p>
             <a:fld id="{1D8BD707-D9CF-40AE-B4C6-C98DA3205C09}" type="datetimeFigureOut">
               <a:rPr lang="en-US"/>
-              <a:t>11/30/2021</a:t>
+              <a:t>12/2/2021</a:t>
             </a:fld>
             <a:endParaRPr lang="en-US"/>
           </a:p>
@@ -1062,7 +1063,7 @@
           <a:p>
             <a:fld id="{1D8BD707-D9CF-40AE-B4C6-C98DA3205C09}" type="datetimeFigureOut">
               <a:rPr lang="en-US"/>
-              <a:t>11/30/2021</a:t>
+              <a:t>12/2/2021</a:t>
             </a:fld>
             <a:endParaRPr lang="en-US"/>
           </a:p>
@@ -1287,7 +1288,7 @@
           <a:p>
             <a:fld id="{1D8BD707-D9CF-40AE-B4C6-C98DA3205C09}" type="datetimeFigureOut">
               <a:rPr lang="en-US"/>
-              <a:t>11/30/2021</a:t>
+              <a:t>12/2/2021</a:t>
             </a:fld>
             <a:endParaRPr lang="en-US"/>
           </a:p>
@@ -4310,7 +4311,7 @@
             <a:pPr algn="ctr"/>
             <a:r>
               <a:rPr lang="es-CO" sz="1200" b="1" dirty="0"/>
-              <a:t>Finalmente el sistema de información Sistematic Cutex optimizará los procesos presentes dentro de la empresa Paletería Cueros y Color siendo un aporte al sector Marroquinero y textil </a:t>
+              <a:t>Finalmente el sistema de información Sistematic Cutex optimizará los procesos presentes dentro de la empresa Paletería Cueros y Color siendo un aporte al sector Marroquinero  </a:t>
             </a:r>
             <a:r>
               <a:rPr lang="es-CO" b="1" dirty="0"/>
@@ -4349,6 +4350,36 @@
           <a:chExt cx="0" cy="0"/>
         </a:xfrm>
       </p:grpSpPr>
+      <p:pic>
+        <p:nvPicPr>
+          <p:cNvPr id="7" name="Imagen 6">
+            <a:extLst>
+              <a:ext uri="{FF2B5EF4-FFF2-40B4-BE49-F238E27FC236}">
+                <a16:creationId xmlns:a16="http://schemas.microsoft.com/office/drawing/2014/main" id="{51632C93-F022-4890-A941-90741FC7F945}"/>
+              </a:ext>
+            </a:extLst>
+          </p:cNvPr>
+          <p:cNvPicPr>
+            <a:picLocks noChangeAspect="1"/>
+          </p:cNvPicPr>
+          <p:nvPr/>
+        </p:nvPicPr>
+        <p:blipFill>
+          <a:blip r:embed="rId2"/>
+          <a:stretch>
+            <a:fillRect/>
+          </a:stretch>
+        </p:blipFill>
+        <p:spPr>
+          <a:xfrm>
+            <a:off x="846266" y="977277"/>
+            <a:ext cx="8096250" cy="4048125"/>
+          </a:xfrm>
+          <a:prstGeom prst="rect">
+            <a:avLst/>
+          </a:prstGeom>
+        </p:spPr>
+      </p:pic>
       <p:sp>
         <p:nvSpPr>
           <p:cNvPr id="2" name="object 2"/>
@@ -4360,6 +4391,10 @@
           </p:nvPr>
         </p:nvSpPr>
         <p:spPr>
+          <a:xfrm>
+            <a:off x="1265516" y="1337978"/>
+            <a:ext cx="2409698" cy="849630"/>
+          </a:xfrm>
           <a:prstGeom prst="rect">
             <a:avLst/>
           </a:prstGeom>
@@ -4398,116 +4433,6 @@
               <a:rPr dirty="0"/>
               <a:t>e</a:t>
             </a:r>
-          </a:p>
-        </p:txBody>
-      </p:sp>
-      <p:sp>
-        <p:nvSpPr>
-          <p:cNvPr id="3" name="object 3"/>
-          <p:cNvSpPr txBox="1"/>
-          <p:nvPr/>
-        </p:nvSpPr>
-        <p:spPr>
-          <a:xfrm>
-            <a:off x="3573271" y="2713685"/>
-            <a:ext cx="2133600" cy="575310"/>
-          </a:xfrm>
-          <a:prstGeom prst="rect">
-            <a:avLst/>
-          </a:prstGeom>
-        </p:spPr>
-        <p:txBody>
-          <a:bodyPr vert="horz" wrap="square" lIns="0" tIns="12700" rIns="0" bIns="0" rtlCol="0">
-            <a:spAutoFit/>
-          </a:bodyPr>
-          <a:lstStyle/>
-          <a:p>
-            <a:pPr marL="12700">
-              <a:lnSpc>
-                <a:spcPct val="100000"/>
-              </a:lnSpc>
-              <a:spcBef>
-                <a:spcPts val="100"/>
-              </a:spcBef>
-            </a:pPr>
-            <a:r>
-              <a:rPr sz="1800" spc="-40" dirty="0">
-                <a:solidFill>
-                  <a:srgbClr val="404040"/>
-                </a:solidFill>
-                <a:latin typeface="Carlito"/>
-                <a:cs typeface="Carlito"/>
-              </a:rPr>
-              <a:t>Texto </a:t>
-            </a:r>
-            <a:r>
-              <a:rPr sz="1800" spc="-10" dirty="0">
-                <a:solidFill>
-                  <a:srgbClr val="404040"/>
-                </a:solidFill>
-                <a:latin typeface="Carlito"/>
-                <a:cs typeface="Carlito"/>
-              </a:rPr>
-              <a:t>corto</a:t>
-            </a:r>
-            <a:r>
-              <a:rPr sz="1800" spc="-35" dirty="0">
-                <a:solidFill>
-                  <a:srgbClr val="404040"/>
-                </a:solidFill>
-                <a:latin typeface="Carlito"/>
-                <a:cs typeface="Carlito"/>
-              </a:rPr>
-              <a:t> </a:t>
-            </a:r>
-            <a:r>
-              <a:rPr sz="1800" spc="-10" dirty="0">
-                <a:solidFill>
-                  <a:srgbClr val="404040"/>
-                </a:solidFill>
-                <a:latin typeface="Carlito"/>
-                <a:cs typeface="Carlito"/>
-              </a:rPr>
-              <a:t>descriptivo</a:t>
-            </a:r>
-            <a:endParaRPr sz="1800">
-              <a:latin typeface="Carlito"/>
-              <a:cs typeface="Carlito"/>
-            </a:endParaRPr>
-          </a:p>
-          <a:p>
-            <a:pPr marL="12700">
-              <a:lnSpc>
-                <a:spcPct val="100000"/>
-              </a:lnSpc>
-              <a:spcBef>
-                <a:spcPts val="5"/>
-              </a:spcBef>
-            </a:pPr>
-            <a:r>
-              <a:rPr sz="1800" dirty="0">
-                <a:solidFill>
-                  <a:srgbClr val="404040"/>
-                </a:solidFill>
-                <a:latin typeface="Carlito"/>
-                <a:cs typeface="Carlito"/>
-              </a:rPr>
-              <a:t>a 2 o 3 </a:t>
-            </a:r>
-            <a:r>
-              <a:rPr sz="1800" spc="-10" dirty="0">
-                <a:solidFill>
-                  <a:srgbClr val="404040"/>
-                </a:solidFill>
-                <a:latin typeface="Carlito"/>
-                <a:cs typeface="Carlito"/>
-              </a:rPr>
-              <a:t>líneas</a:t>
-            </a:r>
-            <a:endParaRPr sz="1800">
-              <a:latin typeface="Carlito"/>
-              <a:cs typeface="Carlito"/>
-            </a:endParaRPr>
           </a:p>
         </p:txBody>
       </p:sp>
@@ -4519,7 +4444,7 @@
         </p:nvSpPr>
         <p:spPr>
           <a:xfrm>
-            <a:off x="3579876" y="2542032"/>
+            <a:off x="1265516" y="2141888"/>
             <a:ext cx="718185" cy="45720"/>
           </a:xfrm>
           <a:custGeom>
@@ -4648,7 +4573,7 @@
           <p:nvPr/>
         </p:nvPicPr>
         <p:blipFill>
-          <a:blip r:embed="rId2">
+          <a:blip r:embed="rId3">
             <a:extLst>
               <a:ext uri="{28A0092B-C50C-407E-A947-70E740481C1C}">
                 <a14:useLocalDpi xmlns:a14="http://schemas.microsoft.com/office/drawing/2010/main" val="0"/>
@@ -4678,6 +4603,72 @@
 </file>
 
 <file path=ppt/slides/slide15.xml><?xml version="1.0" encoding="utf-8"?>
+<p:sld xmlns:a="http://schemas.openxmlformats.org/drawingml/2006/main" xmlns:r="http://schemas.openxmlformats.org/officeDocument/2006/relationships" xmlns:p="http://schemas.openxmlformats.org/presentationml/2006/main">
+  <p:cSld>
+    <p:spTree>
+      <p:nvGrpSpPr>
+        <p:cNvPr id="1" name=""/>
+        <p:cNvGrpSpPr/>
+        <p:nvPr/>
+      </p:nvGrpSpPr>
+      <p:grpSpPr>
+        <a:xfrm>
+          <a:off x="0" y="0"/>
+          <a:ext cx="0" cy="0"/>
+          <a:chOff x="0" y="0"/>
+          <a:chExt cx="0" cy="0"/>
+        </a:xfrm>
+      </p:grpSpPr>
+      <p:pic>
+        <p:nvPicPr>
+          <p:cNvPr id="4" name="Imagen 3" descr="Un letrero de color blanco&#10;&#10;Descripción generada automáticamente con confianza media">
+            <a:extLst>
+              <a:ext uri="{FF2B5EF4-FFF2-40B4-BE49-F238E27FC236}">
+                <a16:creationId xmlns:a16="http://schemas.microsoft.com/office/drawing/2014/main" id="{89062B54-6AA2-4575-881B-85DD62776C34}"/>
+              </a:ext>
+            </a:extLst>
+          </p:cNvPr>
+          <p:cNvPicPr>
+            <a:picLocks noChangeAspect="1"/>
+          </p:cNvPicPr>
+          <p:nvPr/>
+        </p:nvPicPr>
+        <p:blipFill>
+          <a:blip r:embed="rId2">
+            <a:extLst>
+              <a:ext uri="{28A0092B-C50C-407E-A947-70E740481C1C}">
+                <a14:useLocalDpi xmlns:a14="http://schemas.microsoft.com/office/drawing/2010/main" val="0"/>
+              </a:ext>
+            </a:extLst>
+          </a:blip>
+          <a:stretch>
+            <a:fillRect/>
+          </a:stretch>
+        </p:blipFill>
+        <p:spPr>
+          <a:xfrm>
+            <a:off x="7562088" y="4302251"/>
+            <a:ext cx="1362829" cy="567055"/>
+          </a:xfrm>
+          <a:prstGeom prst="rect">
+            <a:avLst/>
+          </a:prstGeom>
+        </p:spPr>
+      </p:pic>
+    </p:spTree>
+    <p:extLst>
+      <p:ext uri="{BB962C8B-B14F-4D97-AF65-F5344CB8AC3E}">
+        <p14:creationId xmlns:p14="http://schemas.microsoft.com/office/powerpoint/2010/main" val="1045583521"/>
+      </p:ext>
+    </p:extLst>
+  </p:cSld>
+  <p:clrMapOvr>
+    <a:masterClrMapping/>
+  </p:clrMapOvr>
+</p:sld>
+</file>
+
+<file path=ppt/slides/slide16.xml><?xml version="1.0" encoding="utf-8"?>
 <p:sld xmlns:a="http://schemas.openxmlformats.org/drawingml/2006/main" xmlns:r="http://schemas.openxmlformats.org/officeDocument/2006/relationships" xmlns:p="http://schemas.openxmlformats.org/presentationml/2006/main" showMasterSp="0">
   <p:cSld>
     <p:spTree>
@@ -5590,7 +5581,7 @@
 </p:sld>
 </file>
 
-<file path=ppt/slides/slide16.xml><?xml version="1.0" encoding="utf-8"?>
+<file path=ppt/slides/slide17.xml><?xml version="1.0" encoding="utf-8"?>
 <p:sld xmlns:a="http://schemas.openxmlformats.org/drawingml/2006/main" xmlns:r="http://schemas.openxmlformats.org/officeDocument/2006/relationships" xmlns:p="http://schemas.openxmlformats.org/presentationml/2006/main" showMasterSp="0">
   <p:cSld>
     <p:spTree>
@@ -9459,7 +9450,7 @@
 </p:sld>
 </file>
 
-<file path=ppt/slides/slide17.xml><?xml version="1.0" encoding="utf-8"?>
+<file path=ppt/slides/slide18.xml><?xml version="1.0" encoding="utf-8"?>
 <p:sld xmlns:a="http://schemas.openxmlformats.org/drawingml/2006/main" xmlns:r="http://schemas.openxmlformats.org/officeDocument/2006/relationships" xmlns:p="http://schemas.openxmlformats.org/presentationml/2006/main" showMasterSp="0">
   <p:cSld>
     <p:spTree>
@@ -13228,7 +13219,7 @@
         <p:spPr>
           <a:xfrm>
             <a:off x="820869" y="2351983"/>
-            <a:ext cx="3224708" cy="1200329"/>
+            <a:ext cx="3224708" cy="1477328"/>
           </a:xfrm>
           <a:prstGeom prst="rect">
             <a:avLst/>
@@ -13248,7 +13239,7 @@
           <a:p>
             <a:r>
               <a:rPr lang="es-CO" dirty="0"/>
-              <a:t>Sistema de información que ayuda a la optimización de los procesos comerciales dentro de la industria del Cuero textil.</a:t>
+              <a:t>Sistema de información que ayuda a la optimización de los procesos comerciales dentro de la industria marroquinera del Cuero textil.</a:t>
             </a:r>
           </a:p>
         </p:txBody>

</xml_diff>

<commit_message>
Agrego actividades de 2do trimestre
</commit_message>
<xml_diff>
--- a/App/app_documentacion/1er_trimestre/1_proyecto/1_1_1_presentacion_proyecto.pptx
+++ b/App/app_documentacion/1er_trimestre/1_proyecto/1_1_1_presentacion_proyecto.pptx
@@ -5,7 +5,7 @@
     <p:sldMasterId id="2147483648" r:id="rId1"/>
   </p:sldMasterIdLst>
   <p:notesMasterIdLst>
-    <p:notesMasterId r:id="rId18"/>
+    <p:notesMasterId r:id="rId19"/>
   </p:notesMasterIdLst>
   <p:sldIdLst>
     <p:sldId id="257" r:id="rId2"/>
@@ -24,6 +24,7 @@
     <p:sldId id="278" r:id="rId15"/>
     <p:sldId id="267" r:id="rId16"/>
     <p:sldId id="262" r:id="rId17"/>
+    <p:sldId id="280" r:id="rId18"/>
   </p:sldIdLst>
   <p:sldSz cx="9144000" cy="5143500" type="screen16x9"/>
   <p:notesSz cx="6858000" cy="9144000"/>
@@ -2860,8 +2861,8 @@
         </p:nvSpPr>
         <p:spPr>
           <a:xfrm>
-            <a:off x="5463843" y="901908"/>
-            <a:ext cx="2756985" cy="954107"/>
+            <a:off x="4572001" y="901908"/>
+            <a:ext cx="3648828" cy="523220"/>
           </a:xfrm>
           <a:prstGeom prst="rect">
             <a:avLst/>
@@ -2935,7 +2936,7 @@
                   </a:schemeClr>
                 </a:solidFill>
               </a:rPr>
-              <a:t>Análisis y Desarrollo de Sistemas de Información, Cuarto Trimestre</a:t>
+              <a:t>Análisis y Desarrollo de Sistemas de Información, Primer Trimestre</a:t>
             </a:r>
           </a:p>
           <a:p>
@@ -2949,7 +2950,7 @@
                   </a:schemeClr>
                 </a:solidFill>
               </a:rPr>
-              <a:t>Instructor Albeiro Ramos </a:t>
+              <a:t>Instructor Albeiro Ramos , Daniel Mora</a:t>
             </a:r>
           </a:p>
           <a:p>
@@ -2963,7 +2964,7 @@
                   </a:schemeClr>
                 </a:solidFill>
               </a:rPr>
-              <a:t>Bogotá, 18 de marzo de 2021</a:t>
+              <a:t>Bogotá, 15 de diciembre de 2021</a:t>
             </a:r>
           </a:p>
         </p:txBody>
@@ -3318,7 +3319,7 @@
                   </a:schemeClr>
                 </a:solidFill>
               </a:rPr>
-              <a:t>   Se propone el desarrollo de un Sistema de Información Web denominado SISTEMATIC CUTEX, que sirva como herramienta software de apoyo al seguimiento de los procesos de la Empresa Peletería Cuero y Color. </a:t>
+              <a:t>   Se propone el desarrollo de un Sistema de Información Web denominado SISTEMATIC CUTEX, que sirva como herramienta software de apoyo al seguimiento de los procesos de la empresa Peletería Cuero y Color. </a:t>
             </a:r>
           </a:p>
           <a:p>
@@ -3470,7 +3471,7 @@
         </p:blipFill>
         <p:spPr>
           <a:xfrm>
-            <a:off x="7497281" y="4296323"/>
+            <a:off x="7482680" y="4391370"/>
             <a:ext cx="1460284" cy="570702"/>
           </a:xfrm>
           <a:prstGeom prst="rect">
@@ -4761,7 +4762,7 @@
                   </a:schemeClr>
                 </a:solidFill>
               </a:rPr>
-              <a:t>  El tiempo estipulado para la entrega del sistema de información es un periodo de 2 años, teniendo en cuenta 8 semestres que comprende el tecnólogo Análisis y Desarrollo de Sistemas de Información, donde se desarrollará la especificación, análisis , diseño, construcción e implementación del sistema, de acuerdo a los objetivos de cada trimestre.</a:t>
+              <a:t>  El tiempo estipulado para la entrega del sistema de información es un periodo de 2 años, teniendo en cuenta 8 trimestres que comprende el tecnólogo Análisis y Desarrollo de Sistemas de Información, donde se desarrollará la especificación, análisis , diseño, construcción e implementación del sistema, de acuerdo a los objetivos de cada trimestre.</a:t>
             </a:r>
           </a:p>
           <a:p>
@@ -6458,6 +6459,235 @@
     <p:extLst>
       <p:ext uri="{BB962C8B-B14F-4D97-AF65-F5344CB8AC3E}">
         <p14:creationId xmlns:p14="http://schemas.microsoft.com/office/powerpoint/2010/main" val="3181596749"/>
+      </p:ext>
+    </p:extLst>
+  </p:cSld>
+  <p:clrMapOvr>
+    <a:masterClrMapping/>
+  </p:clrMapOvr>
+</p:sld>
+</file>
+
+<file path=ppt/slides/slide17.xml><?xml version="1.0" encoding="utf-8"?>
+<p:sld xmlns:a="http://schemas.openxmlformats.org/drawingml/2006/main" xmlns:r="http://schemas.openxmlformats.org/officeDocument/2006/relationships" xmlns:p="http://schemas.openxmlformats.org/presentationml/2006/main">
+  <p:cSld>
+    <p:spTree>
+      <p:nvGrpSpPr>
+        <p:cNvPr id="1" name=""/>
+        <p:cNvGrpSpPr/>
+        <p:nvPr/>
+      </p:nvGrpSpPr>
+      <p:grpSpPr>
+        <a:xfrm>
+          <a:off x="0" y="0"/>
+          <a:ext cx="0" cy="0"/>
+          <a:chOff x="0" y="0"/>
+          <a:chExt cx="0" cy="0"/>
+        </a:xfrm>
+      </p:grpSpPr>
+      <p:sp>
+        <p:nvSpPr>
+          <p:cNvPr id="3" name="CuadroTexto 2">
+            <a:extLst>
+              <a:ext uri="{FF2B5EF4-FFF2-40B4-BE49-F238E27FC236}">
+                <a16:creationId xmlns:a16="http://schemas.microsoft.com/office/drawing/2014/main" id="{3A016DCF-A8A3-40D7-99F3-DFF3A4566A9F}"/>
+              </a:ext>
+            </a:extLst>
+          </p:cNvPr>
+          <p:cNvSpPr txBox="1"/>
+          <p:nvPr/>
+        </p:nvSpPr>
+        <p:spPr>
+          <a:xfrm>
+            <a:off x="1024758" y="1467085"/>
+            <a:ext cx="4572000" cy="2917722"/>
+          </a:xfrm>
+          <a:prstGeom prst="rect">
+            <a:avLst/>
+          </a:prstGeom>
+          <a:noFill/>
+        </p:spPr>
+        <p:txBody>
+          <a:bodyPr wrap="square">
+            <a:spAutoFit/>
+          </a:bodyPr>
+          <a:lstStyle/>
+          <a:p>
+            <a:pPr>
+              <a:lnSpc>
+                <a:spcPct val="120000"/>
+              </a:lnSpc>
+            </a:pPr>
+            <a:r>
+              <a:rPr lang="es-ES_tradnl" sz="1800" b="1" dirty="0">
+                <a:solidFill>
+                  <a:schemeClr val="tx1">
+                    <a:lumMod val="75000"/>
+                    <a:lumOff val="25000"/>
+                  </a:schemeClr>
+                </a:solidFill>
+              </a:rPr>
+              <a:t>Primer Trimestre</a:t>
+            </a:r>
+          </a:p>
+          <a:p>
+            <a:pPr marL="444500" indent="-285750">
+              <a:buFont typeface="Arial" panose="020B0604020202020204" pitchFamily="34" charset="0"/>
+              <a:buChar char="•"/>
+            </a:pPr>
+            <a:r>
+              <a:rPr lang="es-ES" sz="1800" dirty="0">
+                <a:solidFill>
+                  <a:schemeClr val="tx1">
+                    <a:lumMod val="75000"/>
+                    <a:lumOff val="25000"/>
+                  </a:schemeClr>
+                </a:solidFill>
+                <a:highlight>
+                  <a:srgbClr val="FFFF00"/>
+                </a:highlight>
+              </a:rPr>
+              <a:t>Presentación Proyecto</a:t>
+            </a:r>
+          </a:p>
+          <a:p>
+            <a:pPr marL="444500" indent="-285750">
+              <a:buFont typeface="Arial" panose="020B0604020202020204" pitchFamily="34" charset="0"/>
+              <a:buChar char="•"/>
+            </a:pPr>
+            <a:r>
+              <a:rPr lang="es-ES" sz="1800" dirty="0">
+                <a:solidFill>
+                  <a:schemeClr val="tx1">
+                    <a:lumMod val="75000"/>
+                    <a:lumOff val="25000"/>
+                  </a:schemeClr>
+                </a:solidFill>
+                <a:highlight>
+                  <a:srgbClr val="FFFF00"/>
+                </a:highlight>
+              </a:rPr>
+              <a:t>Levantamiento de Información</a:t>
+            </a:r>
+          </a:p>
+          <a:p>
+            <a:pPr marL="444500" indent="-285750">
+              <a:buFont typeface="Arial" panose="020B0604020202020204" pitchFamily="34" charset="0"/>
+              <a:buChar char="•"/>
+            </a:pPr>
+            <a:r>
+              <a:rPr lang="es-ES" sz="1800" dirty="0">
+                <a:solidFill>
+                  <a:schemeClr val="tx1">
+                    <a:lumMod val="75000"/>
+                    <a:lumOff val="25000"/>
+                  </a:schemeClr>
+                </a:solidFill>
+              </a:rPr>
+              <a:t>Diagrama de Procesos </a:t>
+            </a:r>
+            <a:r>
+              <a:rPr lang="es-ES" sz="1800" dirty="0">
+                <a:solidFill>
+                  <a:schemeClr val="tx1">
+                    <a:lumMod val="75000"/>
+                    <a:lumOff val="25000"/>
+                  </a:schemeClr>
+                </a:solidFill>
+                <a:hlinkClick r:id="rId2" action="ppaction://hlinkfile"/>
+              </a:rPr>
+              <a:t>..\4_diagrama de </a:t>
+            </a:r>
+            <a:r>
+              <a:rPr lang="es-ES" sz="1800" dirty="0" err="1">
+                <a:solidFill>
+                  <a:schemeClr val="tx1">
+                    <a:lumMod val="75000"/>
+                    <a:lumOff val="25000"/>
+                  </a:schemeClr>
+                </a:solidFill>
+                <a:hlinkClick r:id="rId2" action="ppaction://hlinkfile"/>
+              </a:rPr>
+              <a:t>prosesos</a:t>
+            </a:r>
+            <a:r>
+              <a:rPr lang="es-ES" sz="1800" dirty="0">
+                <a:solidFill>
+                  <a:schemeClr val="tx1">
+                    <a:lumMod val="75000"/>
+                    <a:lumOff val="25000"/>
+                  </a:schemeClr>
+                </a:solidFill>
+                <a:hlinkClick r:id="rId2" action="ppaction://hlinkfile"/>
+              </a:rPr>
+              <a:t>\1_4_1_diagrama_procesos (1).pdf</a:t>
+            </a:r>
+            <a:endParaRPr lang="es-ES" sz="1800" dirty="0">
+              <a:solidFill>
+                <a:schemeClr val="tx1">
+                  <a:lumMod val="75000"/>
+                  <a:lumOff val="25000"/>
+                </a:schemeClr>
+              </a:solidFill>
+            </a:endParaRPr>
+          </a:p>
+          <a:p>
+            <a:pPr marL="444500" indent="-285750">
+              <a:buFont typeface="Arial" panose="020B0604020202020204" pitchFamily="34" charset="0"/>
+              <a:buChar char="•"/>
+            </a:pPr>
+            <a:endParaRPr lang="es-ES" sz="1800" dirty="0">
+              <a:solidFill>
+                <a:schemeClr val="tx1">
+                  <a:lumMod val="75000"/>
+                  <a:lumOff val="25000"/>
+                </a:schemeClr>
+              </a:solidFill>
+            </a:endParaRPr>
+          </a:p>
+          <a:p>
+            <a:pPr marL="444500" indent="-285750">
+              <a:buFont typeface="Arial" panose="020B0604020202020204" pitchFamily="34" charset="0"/>
+              <a:buChar char="•"/>
+            </a:pPr>
+            <a:r>
+              <a:rPr lang="es-ES" sz="1800" dirty="0">
+                <a:solidFill>
+                  <a:schemeClr val="tx1">
+                    <a:lumMod val="75000"/>
+                    <a:lumOff val="25000"/>
+                  </a:schemeClr>
+                </a:solidFill>
+              </a:rPr>
+              <a:t>Preliminar inventario</a:t>
+            </a:r>
+            <a:r>
+              <a:rPr lang="es-ES" sz="1800" dirty="0">
+                <a:solidFill>
+                  <a:schemeClr val="tx1">
+                    <a:lumMod val="75000"/>
+                    <a:lumOff val="25000"/>
+                  </a:schemeClr>
+                </a:solidFill>
+                <a:hlinkClick r:id="rId3" action="ppaction://hlinkfile"/>
+              </a:rPr>
+              <a:t>..\2_actividades\1_2_2_inventario_v1.pdf</a:t>
+            </a:r>
+            <a:endParaRPr lang="es-ES" sz="1800" dirty="0">
+              <a:solidFill>
+                <a:schemeClr val="tx1">
+                  <a:lumMod val="75000"/>
+                  <a:lumOff val="25000"/>
+                </a:schemeClr>
+              </a:solidFill>
+            </a:endParaRPr>
+          </a:p>
+        </p:txBody>
+      </p:sp>
+    </p:spTree>
+    <p:extLst>
+      <p:ext uri="{BB962C8B-B14F-4D97-AF65-F5344CB8AC3E}">
+        <p14:creationId xmlns:p14="http://schemas.microsoft.com/office/powerpoint/2010/main" val="3708630260"/>
       </p:ext>
     </p:extLst>
   </p:cSld>
@@ -6660,7 +6890,7 @@
                 <a:cs typeface="Calibir"/>
                 <a:sym typeface="Helvetica Neue"/>
               </a:rPr>
-              <a:t>  Los objetivos donde se describe que se quiere alcanzar con este proyecto , la justificación donde se describe la solución al problema , la importancia del sistema de información y su aporte al sector comercial y el alcance donde se describe que va hacer el sistema y su el tiempo que se requiere para desarrollarlo.</a:t>
+              <a:t>  Los objetivos donde se describe que se quiere alcanzar con este proyecto , la justificación donde se describe la solución al problema , la importancia del sistema de información y su aporte al sector comercial y el alcance donde se describe que va hacer el sistema y el tiempo que se requiere para desarrollarlo.</a:t>
             </a:r>
           </a:p>
           <a:p>
@@ -7809,7 +8039,7 @@
         <p:spPr>
           <a:xfrm>
             <a:off x="186435" y="1075298"/>
-            <a:ext cx="8647035" cy="3970318"/>
+            <a:ext cx="8647035" cy="4801314"/>
           </a:xfrm>
           <a:prstGeom prst="rect">
             <a:avLst/>
@@ -7833,10 +8063,28 @@
             <a:endParaRPr lang="es-CO" dirty="0"/>
           </a:p>
           <a:p>
+            <a:r>
+              <a:rPr lang="es-CO" dirty="0"/>
+              <a:t>  Para determinar que sucede al interior de cada proceso se seleccionó como técnicas de recolección, la entrevista y lista de chequeo.  aplicados a la dueña de la empresa la señora Yaneth Ortiz; </a:t>
+            </a:r>
+          </a:p>
+          <a:p>
+            <a:r>
+              <a:rPr lang="es-ES" dirty="0">
+                <a:hlinkClick r:id="rId5" action="ppaction://hlinkfile"/>
+              </a:rPr>
+              <a:t>..\3_recoleccion\1_3_1_recoleccion_informacion (1).pdf</a:t>
+            </a:r>
+            <a:endParaRPr lang="es-ES" dirty="0"/>
+          </a:p>
+          <a:p>
+            <a:endParaRPr lang="es-CO" dirty="0"/>
+          </a:p>
+          <a:p>
             <a:pPr algn="just"/>
             <a:r>
               <a:rPr lang="es-CO" dirty="0"/>
-              <a:t>  Para determinar que sucede al interior de cada proceso se seleccionó como técnica de recolección, la entrevista,  aplicada a la dueña de la empresa la señora Yaneth Ortiz; A través del análisis que se hizo, el proceso de venta funciona como un registro diario en cuadernos, el proceso de facturación se realiza con factura física y el proceso de inventario se realiza mediante anotaciones en cuadernos cada mes.</a:t>
+              <a:t>A través del análisis que se hizo, el proceso de venta funciona como un registro diario en cuadernos, el proceso de facturación se realiza con factura física y el proceso de inventario se realiza mediante anotaciones en cuadernos cada mes.</a:t>
             </a:r>
           </a:p>
           <a:p>
@@ -7907,8 +8155,8 @@
         </p:nvSpPr>
         <p:spPr>
           <a:xfrm>
-            <a:off x="609599" y="1678375"/>
-            <a:ext cx="8261132" cy="2446824"/>
+            <a:off x="609599" y="1678374"/>
+            <a:ext cx="7693573" cy="1338828"/>
           </a:xfrm>
           <a:prstGeom prst="rect">
             <a:avLst/>
@@ -7920,114 +8168,6 @@
             <a:spAutoFit/>
           </a:bodyPr>
           <a:lstStyle/>
-          <a:p>
-            <a:pPr algn="just"/>
-            <a:r>
-              <a:rPr lang="es-ES" dirty="0">
-                <a:hlinkClick r:id="rId2" action="ppaction://hlinkfile"/>
-              </a:rPr>
-              <a:t>..\..\..\</a:t>
-            </a:r>
-            <a:r>
-              <a:rPr lang="es-ES" dirty="0" err="1">
-                <a:hlinkClick r:id="rId2" action="ppaction://hlinkfile"/>
-              </a:rPr>
-              <a:t>xampp</a:t>
-            </a:r>
-            <a:r>
-              <a:rPr lang="es-ES" dirty="0">
-                <a:hlinkClick r:id="rId2" action="ppaction://hlinkfile"/>
-              </a:rPr>
-              <a:t>\</a:t>
-            </a:r>
-            <a:r>
-              <a:rPr lang="es-ES" dirty="0" err="1">
-                <a:hlinkClick r:id="rId2" action="ppaction://hlinkfile"/>
-              </a:rPr>
-              <a:t>htdocs</a:t>
-            </a:r>
-            <a:r>
-              <a:rPr lang="es-ES" dirty="0">
-                <a:hlinkClick r:id="rId2" action="ppaction://hlinkfile"/>
-              </a:rPr>
-              <a:t>\Documentos\</a:t>
-            </a:r>
-            <a:r>
-              <a:rPr lang="es-ES" dirty="0" err="1">
-                <a:hlinkClick r:id="rId2" action="ppaction://hlinkfile"/>
-              </a:rPr>
-              <a:t>Proyectos_ADSI</a:t>
-            </a:r>
-            <a:r>
-              <a:rPr lang="es-ES" dirty="0">
-                <a:hlinkClick r:id="rId2" action="ppaction://hlinkfile"/>
-              </a:rPr>
-              <a:t>\App\</a:t>
-            </a:r>
-            <a:r>
-              <a:rPr lang="es-ES" dirty="0" err="1">
-                <a:hlinkClick r:id="rId2" action="ppaction://hlinkfile"/>
-              </a:rPr>
-              <a:t>app_documentacion</a:t>
-            </a:r>
-            <a:r>
-              <a:rPr lang="es-ES" dirty="0">
-                <a:hlinkClick r:id="rId2" action="ppaction://hlinkfile"/>
-              </a:rPr>
-              <a:t>\1er_trimestre\3_recoleccion\1_3_1_recoleccion_informacion (1).pdf</a:t>
-            </a:r>
-            <a:endParaRPr lang="es-ES" dirty="0"/>
-          </a:p>
-          <a:p>
-            <a:pPr algn="just"/>
-            <a:endParaRPr lang="es-ES" dirty="0"/>
-          </a:p>
-          <a:p>
-            <a:pPr algn="just"/>
-            <a:r>
-              <a:rPr lang="es-ES" dirty="0">
-                <a:hlinkClick r:id="rId3" action="ppaction://hlinkfile"/>
-              </a:rPr>
-              <a:t>..\</a:t>
-            </a:r>
-            <a:r>
-              <a:rPr lang="es-ES" dirty="0" err="1">
-                <a:hlinkClick r:id="rId3" action="ppaction://hlinkfile"/>
-              </a:rPr>
-              <a:t>Documents</a:t>
-            </a:r>
-            <a:r>
-              <a:rPr lang="es-ES" dirty="0">
-                <a:hlinkClick r:id="rId3" action="ppaction://hlinkfile"/>
-              </a:rPr>
-              <a:t>\</a:t>
-            </a:r>
-            <a:r>
-              <a:rPr lang="es-ES" dirty="0" err="1">
-                <a:hlinkClick r:id="rId3" action="ppaction://hlinkfile"/>
-              </a:rPr>
-              <a:t>kathe</a:t>
-            </a:r>
-            <a:r>
-              <a:rPr lang="es-ES" dirty="0">
-                <a:hlinkClick r:id="rId3" action="ppaction://hlinkfile"/>
-              </a:rPr>
-              <a:t>\SENA\1 trimestre\Proyecto ADSI\</a:t>
-            </a:r>
-            <a:r>
-              <a:rPr lang="es-ES" dirty="0" err="1">
-                <a:hlinkClick r:id="rId3" action="ppaction://hlinkfile"/>
-              </a:rPr>
-              <a:t>Analisis</a:t>
-            </a:r>
-            <a:r>
-              <a:rPr lang="es-ES" dirty="0">
-                <a:hlinkClick r:id="rId3" action="ppaction://hlinkfile"/>
-              </a:rPr>
-              <a:t> Entrevista png.png</a:t>
-            </a:r>
-            <a:endParaRPr lang="es-ES" dirty="0"/>
-          </a:p>
           <a:p>
             <a:pPr algn="just"/>
             <a:endParaRPr lang="es-CO" sz="900" dirty="0"/>

</xml_diff>